<commit_message>
fix: filters with checkboxes
</commit_message>
<xml_diff>
--- a/public/Projet Sortie.pptx
+++ b/public/Projet Sortie.pptx
@@ -111,6 +111,11 @@
       </a:defRPr>
     </a:lvl9pPr>
   </p:defaultTextStyle>
+  <p:extLst>
+    <p:ext uri="{EFAFB233-063F-42B5-8137-9DF3F51BA10A}">
+      <p15:sldGuideLst xmlns:p15="http://schemas.microsoft.com/office/powerpoint/2012/main"/>
+    </p:ext>
+  </p:extLst>
 </p:presentation>
 </file>
 
@@ -261,7 +266,7 @@
           <a:p>
             <a:fld id="{E38A6970-8988-4049-B54E-D9295BF9F84D}" type="datetimeFigureOut">
               <a:rPr lang="fr-FR" smtClean="0"/>
-              <a:t>26/10/2023</a:t>
+              <a:t>27/10/2023</a:t>
             </a:fld>
             <a:endParaRPr lang="fr-FR"/>
           </a:p>
@@ -459,7 +464,7 @@
           <a:p>
             <a:fld id="{E38A6970-8988-4049-B54E-D9295BF9F84D}" type="datetimeFigureOut">
               <a:rPr lang="fr-FR" smtClean="0"/>
-              <a:t>26/10/2023</a:t>
+              <a:t>27/10/2023</a:t>
             </a:fld>
             <a:endParaRPr lang="fr-FR"/>
           </a:p>
@@ -667,7 +672,7 @@
           <a:p>
             <a:fld id="{E38A6970-8988-4049-B54E-D9295BF9F84D}" type="datetimeFigureOut">
               <a:rPr lang="fr-FR" smtClean="0"/>
-              <a:t>26/10/2023</a:t>
+              <a:t>27/10/2023</a:t>
             </a:fld>
             <a:endParaRPr lang="fr-FR"/>
           </a:p>
@@ -865,7 +870,7 @@
           <a:p>
             <a:fld id="{E38A6970-8988-4049-B54E-D9295BF9F84D}" type="datetimeFigureOut">
               <a:rPr lang="fr-FR" smtClean="0"/>
-              <a:t>26/10/2023</a:t>
+              <a:t>27/10/2023</a:t>
             </a:fld>
             <a:endParaRPr lang="fr-FR"/>
           </a:p>
@@ -1140,7 +1145,7 @@
           <a:p>
             <a:fld id="{E38A6970-8988-4049-B54E-D9295BF9F84D}" type="datetimeFigureOut">
               <a:rPr lang="fr-FR" smtClean="0"/>
-              <a:t>26/10/2023</a:t>
+              <a:t>27/10/2023</a:t>
             </a:fld>
             <a:endParaRPr lang="fr-FR"/>
           </a:p>
@@ -1405,7 +1410,7 @@
           <a:p>
             <a:fld id="{E38A6970-8988-4049-B54E-D9295BF9F84D}" type="datetimeFigureOut">
               <a:rPr lang="fr-FR" smtClean="0"/>
-              <a:t>26/10/2023</a:t>
+              <a:t>27/10/2023</a:t>
             </a:fld>
             <a:endParaRPr lang="fr-FR"/>
           </a:p>
@@ -1817,7 +1822,7 @@
           <a:p>
             <a:fld id="{E38A6970-8988-4049-B54E-D9295BF9F84D}" type="datetimeFigureOut">
               <a:rPr lang="fr-FR" smtClean="0"/>
-              <a:t>26/10/2023</a:t>
+              <a:t>27/10/2023</a:t>
             </a:fld>
             <a:endParaRPr lang="fr-FR"/>
           </a:p>
@@ -1958,7 +1963,7 @@
           <a:p>
             <a:fld id="{E38A6970-8988-4049-B54E-D9295BF9F84D}" type="datetimeFigureOut">
               <a:rPr lang="fr-FR" smtClean="0"/>
-              <a:t>26/10/2023</a:t>
+              <a:t>27/10/2023</a:t>
             </a:fld>
             <a:endParaRPr lang="fr-FR"/>
           </a:p>
@@ -2071,7 +2076,7 @@
           <a:p>
             <a:fld id="{E38A6970-8988-4049-B54E-D9295BF9F84D}" type="datetimeFigureOut">
               <a:rPr lang="fr-FR" smtClean="0"/>
-              <a:t>26/10/2023</a:t>
+              <a:t>27/10/2023</a:t>
             </a:fld>
             <a:endParaRPr lang="fr-FR"/>
           </a:p>
@@ -2382,7 +2387,7 @@
           <a:p>
             <a:fld id="{E38A6970-8988-4049-B54E-D9295BF9F84D}" type="datetimeFigureOut">
               <a:rPr lang="fr-FR" smtClean="0"/>
-              <a:t>26/10/2023</a:t>
+              <a:t>27/10/2023</a:t>
             </a:fld>
             <a:endParaRPr lang="fr-FR"/>
           </a:p>
@@ -2670,7 +2675,7 @@
           <a:p>
             <a:fld id="{E38A6970-8988-4049-B54E-D9295BF9F84D}" type="datetimeFigureOut">
               <a:rPr lang="fr-FR" smtClean="0"/>
-              <a:t>26/10/2023</a:t>
+              <a:t>27/10/2023</a:t>
             </a:fld>
             <a:endParaRPr lang="fr-FR"/>
           </a:p>
@@ -2941,7 +2946,7 @@
           <a:p>
             <a:fld id="{E38A6970-8988-4049-B54E-D9295BF9F84D}" type="datetimeFigureOut">
               <a:rPr lang="fr-FR" smtClean="0"/>
-              <a:t>26/10/2023</a:t>
+              <a:t>27/10/2023</a:t>
             </a:fld>
             <a:endParaRPr lang="fr-FR"/>
           </a:p>
@@ -3792,7 +3797,7 @@
                 </a:solidFill>
                 <a:latin typeface="+mj-lt"/>
               </a:rPr>
-              <a:t>l’authentication</a:t>
+              <a:t>l’authentification</a:t>
             </a:r>
             <a:endParaRPr lang="en-US" sz="1800" dirty="0">
               <a:solidFill>
@@ -4527,7 +4532,7 @@
               <a:buFont typeface="Arial" panose="020B0604020202020204" pitchFamily="34" charset="0"/>
               <a:buChar char="•"/>
             </a:pPr>
-            <a:endParaRPr lang="en-US" sz="2000">
+            <a:endParaRPr lang="en-US" sz="2000" dirty="0">
               <a:solidFill>
                 <a:srgbClr val="FFFFFF"/>
               </a:solidFill>
@@ -4539,13 +4544,26 @@
               <a:buChar char="•"/>
             </a:pPr>
             <a:r>
-              <a:rPr lang="en-US" sz="2000">
+              <a:rPr lang="en-US" sz="2000" dirty="0">
                 <a:solidFill>
                   <a:srgbClr val="FFFFFF"/>
                 </a:solidFill>
               </a:rPr>
-              <a:t>par email et par nom d’utilisateur</a:t>
-            </a:r>
+              <a:t>par email et par nom </a:t>
+            </a:r>
+            <a:r>
+              <a:rPr lang="en-US" sz="2000" dirty="0" err="1">
+                <a:solidFill>
+                  <a:srgbClr val="FFFFFF"/>
+                </a:solidFill>
+              </a:rPr>
+              <a:t>d’utilisateur</a:t>
+            </a:r>
+            <a:endParaRPr lang="en-US" sz="2000" dirty="0">
+              <a:solidFill>
+                <a:srgbClr val="FFFFFF"/>
+              </a:solidFill>
+            </a:endParaRPr>
           </a:p>
           <a:p>
             <a:pPr indent="-228600">
@@ -4553,59 +4571,124 @@
               <a:buChar char="•"/>
             </a:pPr>
             <a:r>
-              <a:rPr lang="en-US" sz="2000">
+              <a:rPr lang="en-US" sz="2000" dirty="0">
                 <a:solidFill>
                   <a:srgbClr val="FFFFFF"/>
                 </a:solidFill>
               </a:rPr>
-              <a:t>conservation des dernières informations de connexion</a:t>
-            </a:r>
+              <a:t>conservation des </a:t>
+            </a:r>
+            <a:r>
+              <a:rPr lang="en-US" sz="2000" dirty="0" err="1">
+                <a:solidFill>
+                  <a:srgbClr val="FFFFFF"/>
+                </a:solidFill>
+              </a:rPr>
+              <a:t>dernières</a:t>
+            </a:r>
+            <a:r>
+              <a:rPr lang="en-US" sz="2000" dirty="0">
+                <a:solidFill>
+                  <a:srgbClr val="FFFFFF"/>
+                </a:solidFill>
+              </a:rPr>
+              <a:t> </a:t>
+            </a:r>
+            <a:r>
+              <a:rPr lang="en-US" sz="2000" dirty="0" err="1">
+                <a:solidFill>
+                  <a:srgbClr val="FFFFFF"/>
+                </a:solidFill>
+              </a:rPr>
+              <a:t>informations</a:t>
+            </a:r>
+            <a:r>
+              <a:rPr lang="en-US" sz="2000" dirty="0">
+                <a:solidFill>
+                  <a:srgbClr val="FFFFFF"/>
+                </a:solidFill>
+              </a:rPr>
+              <a:t> de </a:t>
+            </a:r>
+            <a:r>
+              <a:rPr lang="en-US" sz="2000" dirty="0" err="1">
+                <a:solidFill>
+                  <a:srgbClr val="FFFFFF"/>
+                </a:solidFill>
+              </a:rPr>
+              <a:t>connexion</a:t>
+            </a:r>
+            <a:endParaRPr lang="en-US" sz="2000" dirty="0">
+              <a:solidFill>
+                <a:srgbClr val="FFFFFF"/>
+              </a:solidFill>
+            </a:endParaRPr>
           </a:p>
           <a:p>
             <a:pPr indent="-228600">
               <a:buFont typeface="Arial" panose="020B0604020202020204" pitchFamily="34" charset="0"/>
               <a:buChar char="•"/>
             </a:pPr>
-            <a:endParaRPr lang="en-US" sz="2000">
+            <a:endParaRPr lang="en-US" sz="2000" dirty="0">
               <a:solidFill>
                 <a:srgbClr val="FFFFFF"/>
               </a:solidFill>
             </a:endParaRPr>
           </a:p>
           <a:p>
+            <a:r>
+              <a:rPr lang="en-US" sz="2000" dirty="0">
+                <a:solidFill>
+                  <a:srgbClr val="FFFFFF"/>
+                </a:solidFill>
+              </a:rPr>
+              <a:t>TODO:</a:t>
+            </a:r>
+          </a:p>
+          <a:p>
             <a:pPr indent="-228600">
               <a:buFont typeface="Arial" panose="020B0604020202020204" pitchFamily="34" charset="0"/>
               <a:buChar char="•"/>
             </a:pPr>
             <a:r>
-              <a:rPr lang="en-US" sz="2000">
+              <a:rPr lang="en-US" sz="2000" dirty="0">
                 <a:solidFill>
                   <a:srgbClr val="FFFFFF"/>
                 </a:solidFill>
               </a:rPr>
-              <a:t>TODO:</a:t>
-            </a:r>
+              <a:t>gestion du mot de passe </a:t>
+            </a:r>
+            <a:r>
+              <a:rPr lang="en-US" sz="2000" dirty="0" err="1">
+                <a:solidFill>
+                  <a:srgbClr val="FFFFFF"/>
+                </a:solidFill>
+              </a:rPr>
+              <a:t>oublié</a:t>
+            </a:r>
+            <a:endParaRPr lang="en-US" sz="2000" dirty="0">
+              <a:solidFill>
+                <a:srgbClr val="FFFFFF"/>
+              </a:solidFill>
+            </a:endParaRPr>
           </a:p>
           <a:p>
             <a:pPr indent="-228600">
               <a:buFont typeface="Arial" panose="020B0604020202020204" pitchFamily="34" charset="0"/>
               <a:buChar char="•"/>
             </a:pPr>
-            <a:r>
-              <a:rPr lang="en-US" sz="2000">
-                <a:solidFill>
-                  <a:srgbClr val="FFFFFF"/>
-                </a:solidFill>
-              </a:rPr>
-              <a:t>gestion du mot de passe oublié</a:t>
-            </a:r>
+            <a:endParaRPr lang="en-US" sz="2000" dirty="0">
+              <a:solidFill>
+                <a:srgbClr val="FFFFFF"/>
+              </a:solidFill>
+            </a:endParaRPr>
           </a:p>
           <a:p>
             <a:pPr indent="-228600">
               <a:buFont typeface="Arial" panose="020B0604020202020204" pitchFamily="34" charset="0"/>
               <a:buChar char="•"/>
             </a:pPr>
-            <a:endParaRPr lang="en-US" sz="2000">
+            <a:endParaRPr lang="en-US" sz="2000" dirty="0">
               <a:solidFill>
                 <a:srgbClr val="FFFFFF"/>
               </a:solidFill>
@@ -4616,18 +4699,7 @@
               <a:buFont typeface="Arial" panose="020B0604020202020204" pitchFamily="34" charset="0"/>
               <a:buChar char="•"/>
             </a:pPr>
-            <a:endParaRPr lang="en-US" sz="2000">
-              <a:solidFill>
-                <a:srgbClr val="FFFFFF"/>
-              </a:solidFill>
-            </a:endParaRPr>
-          </a:p>
-          <a:p>
-            <a:pPr indent="-228600">
-              <a:buFont typeface="Arial" panose="020B0604020202020204" pitchFamily="34" charset="0"/>
-              <a:buChar char="•"/>
-            </a:pPr>
-            <a:endParaRPr lang="en-US" sz="2000">
+            <a:endParaRPr lang="en-US" sz="2000" dirty="0">
               <a:solidFill>
                 <a:srgbClr val="FFFFFF"/>
               </a:solidFill>
@@ -5141,7 +5213,7 @@
               <a:buFont typeface="Arial" panose="020B0604020202020204" pitchFamily="34" charset="0"/>
               <a:buChar char="•"/>
             </a:pPr>
-            <a:endParaRPr lang="en-US" sz="2000">
+            <a:endParaRPr lang="en-US" sz="2000" dirty="0">
               <a:solidFill>
                 <a:srgbClr val="FFFFFF"/>
               </a:solidFill>
@@ -5153,12 +5225,36 @@
               <a:buChar char="•"/>
             </a:pPr>
             <a:r>
-              <a:rPr lang="en-US" sz="2000">
+              <a:rPr lang="en-US" sz="2000" dirty="0" err="1">
                 <a:solidFill>
                   <a:srgbClr val="FFFFFF"/>
                 </a:solidFill>
               </a:rPr>
-              <a:t>Filtrage par campus, nom ou date</a:t>
+              <a:t>Filtrage</a:t>
+            </a:r>
+            <a:r>
+              <a:rPr lang="en-US" sz="2000" dirty="0">
+                <a:solidFill>
+                  <a:srgbClr val="FFFFFF"/>
+                </a:solidFill>
+              </a:rPr>
+              <a:t> par campus, nom </a:t>
+            </a:r>
+            <a:r>
+              <a:rPr lang="en-US" sz="2000" dirty="0" err="1">
+                <a:solidFill>
+                  <a:srgbClr val="FFFFFF"/>
+                </a:solidFill>
+              </a:rPr>
+              <a:t>ou</a:t>
+            </a:r>
+            <a:r>
+              <a:rPr lang="en-US" sz="2000" dirty="0">
+                <a:solidFill>
+                  <a:srgbClr val="FFFFFF"/>
+                </a:solidFill>
+              </a:rPr>
+              <a:t> date</a:t>
             </a:r>
           </a:p>
           <a:p>
@@ -5166,7 +5262,7 @@
               <a:buFont typeface="Arial" panose="020B0604020202020204" pitchFamily="34" charset="0"/>
               <a:buChar char="•"/>
             </a:pPr>
-            <a:endParaRPr lang="en-US" sz="2000">
+            <a:endParaRPr lang="en-US" sz="2000" dirty="0">
               <a:solidFill>
                 <a:srgbClr val="FFFFFF"/>
               </a:solidFill>
@@ -5178,12 +5274,84 @@
               <a:buChar char="•"/>
             </a:pPr>
             <a:r>
-              <a:rPr lang="en-US" sz="2000">
+              <a:rPr lang="en-US" sz="2000" dirty="0" err="1">
                 <a:solidFill>
                   <a:srgbClr val="FFFFFF"/>
                 </a:solidFill>
               </a:rPr>
-              <a:t>TODO:</a:t>
+              <a:t>Filtrage</a:t>
+            </a:r>
+            <a:r>
+              <a:rPr lang="en-US" sz="2000" dirty="0">
+                <a:solidFill>
+                  <a:srgbClr val="FFFFFF"/>
+                </a:solidFill>
+              </a:rPr>
+              <a:t> par </a:t>
+            </a:r>
+            <a:r>
+              <a:rPr lang="en-US" sz="2000" dirty="0" err="1">
+                <a:solidFill>
+                  <a:srgbClr val="FFFFFF"/>
+                </a:solidFill>
+              </a:rPr>
+              <a:t>critère</a:t>
+            </a:r>
+            <a:r>
+              <a:rPr lang="en-US" sz="2000" dirty="0">
+                <a:solidFill>
+                  <a:srgbClr val="FFFFFF"/>
+                </a:solidFill>
+              </a:rPr>
+              <a:t> : </a:t>
+            </a:r>
+            <a:r>
+              <a:rPr lang="en-US" sz="2000" dirty="0" err="1">
+                <a:solidFill>
+                  <a:srgbClr val="FFFFFF"/>
+                </a:solidFill>
+              </a:rPr>
+              <a:t>organisteur</a:t>
+            </a:r>
+            <a:r>
+              <a:rPr lang="en-US" sz="2000" dirty="0">
+                <a:solidFill>
+                  <a:srgbClr val="FFFFFF"/>
+                </a:solidFill>
+              </a:rPr>
+              <a:t>, </a:t>
+            </a:r>
+            <a:r>
+              <a:rPr lang="en-US" sz="2000" dirty="0" err="1">
+                <a:solidFill>
+                  <a:srgbClr val="FFFFFF"/>
+                </a:solidFill>
+              </a:rPr>
+              <a:t>inscrit</a:t>
+            </a:r>
+            <a:r>
+              <a:rPr lang="en-US" sz="2000" dirty="0">
+                <a:solidFill>
+                  <a:srgbClr val="FFFFFF"/>
+                </a:solidFill>
+              </a:rPr>
+              <a:t> </a:t>
+            </a:r>
+            <a:r>
+              <a:rPr lang="en-US" sz="2000" dirty="0" err="1">
+                <a:solidFill>
+                  <a:srgbClr val="FFFFFF"/>
+                </a:solidFill>
+              </a:rPr>
+              <a:t>ou</a:t>
+            </a:r>
+            <a:r>
+              <a:rPr lang="en-US" sz="2000" dirty="0">
+                <a:solidFill>
+                  <a:srgbClr val="FFFFFF"/>
+                </a:solidFill>
+              </a:rPr>
+              <a:t> non, sorties passes…</a:t>
             </a:r>
           </a:p>
           <a:p>
@@ -5191,43 +5359,48 @@
               <a:buFont typeface="Arial" panose="020B0604020202020204" pitchFamily="34" charset="0"/>
               <a:buChar char="•"/>
             </a:pPr>
-            <a:r>
-              <a:rPr lang="en-US" sz="2000">
-                <a:solidFill>
-                  <a:srgbClr val="FFFFFF"/>
-                </a:solidFill>
-              </a:rPr>
-              <a:t>Filtrage par checkbox</a:t>
-            </a:r>
+            <a:endParaRPr lang="en-US" sz="2000" dirty="0">
+              <a:solidFill>
+                <a:srgbClr val="FFFFFF"/>
+              </a:solidFill>
+            </a:endParaRPr>
           </a:p>
           <a:p>
             <a:pPr indent="-228600">
               <a:buFont typeface="Arial" panose="020B0604020202020204" pitchFamily="34" charset="0"/>
               <a:buChar char="•"/>
             </a:pPr>
-            <a:endParaRPr lang="en-US" sz="2000">
-              <a:solidFill>
-                <a:srgbClr val="FFFFFF"/>
-              </a:solidFill>
-            </a:endParaRPr>
+            <a:r>
+              <a:rPr lang="en-US" sz="2000" dirty="0">
+                <a:solidFill>
+                  <a:srgbClr val="FFFFFF"/>
+                </a:solidFill>
+              </a:rPr>
+              <a:t>Gestion </a:t>
+            </a:r>
+            <a:r>
+              <a:rPr lang="en-US" sz="2000" dirty="0" err="1">
+                <a:solidFill>
+                  <a:srgbClr val="FFFFFF"/>
+                </a:solidFill>
+              </a:rPr>
+              <a:t>automatique</a:t>
+            </a:r>
+            <a:r>
+              <a:rPr lang="en-US" sz="2000" dirty="0">
+                <a:solidFill>
+                  <a:srgbClr val="FFFFFF"/>
+                </a:solidFill>
+              </a:rPr>
+              <a:t> des états</a:t>
+            </a:r>
           </a:p>
           <a:p>
             <a:pPr indent="-228600">
               <a:buFont typeface="Arial" panose="020B0604020202020204" pitchFamily="34" charset="0"/>
               <a:buChar char="•"/>
             </a:pPr>
-            <a:endParaRPr lang="en-US" sz="2000">
-              <a:solidFill>
-                <a:srgbClr val="FFFFFF"/>
-              </a:solidFill>
-            </a:endParaRPr>
-          </a:p>
-          <a:p>
-            <a:pPr indent="-228600">
-              <a:buFont typeface="Arial" panose="020B0604020202020204" pitchFamily="34" charset="0"/>
-              <a:buChar char="•"/>
-            </a:pPr>
-            <a:endParaRPr lang="en-US" sz="2000">
+            <a:endParaRPr lang="en-US" sz="2000" dirty="0">
               <a:solidFill>
                 <a:srgbClr val="FFFFFF"/>
               </a:solidFill>
@@ -6314,24 +6487,58 @@
               <a:buFont typeface="Arial" panose="020B0604020202020204" pitchFamily="34" charset="0"/>
               <a:buChar char="•"/>
             </a:pPr>
-            <a:endParaRPr lang="en-US" sz="2000">
+            <a:endParaRPr lang="en-US" sz="2000" dirty="0">
               <a:solidFill>
                 <a:srgbClr val="FFFFFF"/>
               </a:solidFill>
             </a:endParaRPr>
           </a:p>
           <a:p>
+            <a:r>
+              <a:rPr lang="en-US" sz="2000" dirty="0">
+                <a:solidFill>
+                  <a:srgbClr val="FFFFFF"/>
+                </a:solidFill>
+              </a:rPr>
+              <a:t>TODO:</a:t>
+            </a:r>
+          </a:p>
+          <a:p>
             <a:pPr indent="-228600">
               <a:buFont typeface="Arial" panose="020B0604020202020204" pitchFamily="34" charset="0"/>
               <a:buChar char="•"/>
             </a:pPr>
             <a:r>
-              <a:rPr lang="en-US" sz="2000">
+              <a:rPr lang="en-US" sz="2000" dirty="0" err="1">
                 <a:solidFill>
                   <a:srgbClr val="FFFFFF"/>
                 </a:solidFill>
               </a:rPr>
-              <a:t>TODO:</a:t>
+              <a:t>possibilité</a:t>
+            </a:r>
+            <a:r>
+              <a:rPr lang="en-US" sz="2000" dirty="0">
+                <a:solidFill>
+                  <a:srgbClr val="FFFFFF"/>
+                </a:solidFill>
+              </a:rPr>
+              <a:t> </a:t>
+            </a:r>
+            <a:r>
+              <a:rPr lang="en-US" sz="2000" dirty="0" err="1">
+                <a:solidFill>
+                  <a:srgbClr val="FFFFFF"/>
+                </a:solidFill>
+              </a:rPr>
+              <a:t>d’ajouter</a:t>
+            </a:r>
+            <a:r>
+              <a:rPr lang="en-US" sz="2000" dirty="0">
+                <a:solidFill>
+                  <a:srgbClr val="FFFFFF"/>
+                </a:solidFill>
+              </a:rPr>
+              <a:t> un nouveau lieu</a:t>
             </a:r>
           </a:p>
           <a:p>
@@ -6340,12 +6547,20 @@
               <a:buChar char="•"/>
             </a:pPr>
             <a:r>
-              <a:rPr lang="en-US" sz="2000">
+              <a:rPr lang="en-US" sz="2000" dirty="0" err="1">
                 <a:solidFill>
                   <a:srgbClr val="FFFFFF"/>
                 </a:solidFill>
               </a:rPr>
-              <a:t>possibilité d’ajouter un nouveau lieu</a:t>
+              <a:t>affichage</a:t>
+            </a:r>
+            <a:r>
+              <a:rPr lang="en-US" sz="2000" dirty="0">
+                <a:solidFill>
+                  <a:srgbClr val="FFFFFF"/>
+                </a:solidFill>
+              </a:rPr>
+              <a:t> de longitude et latitude</a:t>
             </a:r>
           </a:p>
           <a:p>
@@ -6353,32 +6568,18 @@
               <a:buFont typeface="Arial" panose="020B0604020202020204" pitchFamily="34" charset="0"/>
               <a:buChar char="•"/>
             </a:pPr>
-            <a:r>
-              <a:rPr lang="en-US" sz="2000">
-                <a:solidFill>
-                  <a:srgbClr val="FFFFFF"/>
-                </a:solidFill>
-              </a:rPr>
-              <a:t>affichage de longitude et latitude</a:t>
-            </a:r>
+            <a:endParaRPr lang="en-US" sz="2000" dirty="0">
+              <a:solidFill>
+                <a:srgbClr val="FFFFFF"/>
+              </a:solidFill>
+            </a:endParaRPr>
           </a:p>
           <a:p>
             <a:pPr indent="-228600">
               <a:buFont typeface="Arial" panose="020B0604020202020204" pitchFamily="34" charset="0"/>
               <a:buChar char="•"/>
             </a:pPr>
-            <a:endParaRPr lang="en-US" sz="2000">
-              <a:solidFill>
-                <a:srgbClr val="FFFFFF"/>
-              </a:solidFill>
-            </a:endParaRPr>
-          </a:p>
-          <a:p>
-            <a:pPr indent="-228600">
-              <a:buFont typeface="Arial" panose="020B0604020202020204" pitchFamily="34" charset="0"/>
-              <a:buChar char="•"/>
-            </a:pPr>
-            <a:endParaRPr lang="en-US" sz="2000">
+            <a:endParaRPr lang="en-US" sz="2000" dirty="0">
               <a:solidFill>
                 <a:srgbClr val="FFFFFF"/>
               </a:solidFill>
@@ -6866,24 +7067,50 @@
               <a:buFont typeface="Arial" panose="020B0604020202020204" pitchFamily="34" charset="0"/>
               <a:buChar char="•"/>
             </a:pPr>
-            <a:endParaRPr lang="en-US" sz="2000">
+            <a:endParaRPr lang="en-US" sz="2000" dirty="0">
               <a:solidFill>
                 <a:srgbClr val="FFFFFF"/>
               </a:solidFill>
             </a:endParaRPr>
           </a:p>
           <a:p>
+            <a:r>
+              <a:rPr lang="en-US" sz="2000" dirty="0">
+                <a:solidFill>
+                  <a:srgbClr val="FFFFFF"/>
+                </a:solidFill>
+              </a:rPr>
+              <a:t>TODO:</a:t>
+            </a:r>
+          </a:p>
+          <a:p>
             <a:pPr indent="-228600">
               <a:buFont typeface="Arial" panose="020B0604020202020204" pitchFamily="34" charset="0"/>
               <a:buChar char="•"/>
             </a:pPr>
             <a:r>
-              <a:rPr lang="en-US" sz="2000">
+              <a:rPr lang="en-US" sz="2000" dirty="0">
                 <a:solidFill>
                   <a:srgbClr val="FFFFFF"/>
                 </a:solidFill>
               </a:rPr>
-              <a:t>TODO:</a:t>
+              <a:t>gestion de </a:t>
+            </a:r>
+            <a:r>
+              <a:rPr lang="en-US" sz="2000" dirty="0" err="1">
+                <a:solidFill>
+                  <a:srgbClr val="FFFFFF"/>
+                </a:solidFill>
+              </a:rPr>
+              <a:t>l’annulation</a:t>
+            </a:r>
+            <a:r>
+              <a:rPr lang="en-US" sz="2000" dirty="0">
+                <a:solidFill>
+                  <a:srgbClr val="FFFFFF"/>
+                </a:solidFill>
+              </a:rPr>
+              <a:t> de la sortie</a:t>
             </a:r>
           </a:p>
           <a:p>
@@ -6891,32 +7118,18 @@
               <a:buFont typeface="Arial" panose="020B0604020202020204" pitchFamily="34" charset="0"/>
               <a:buChar char="•"/>
             </a:pPr>
-            <a:r>
-              <a:rPr lang="en-US" sz="2000">
-                <a:solidFill>
-                  <a:srgbClr val="FFFFFF"/>
-                </a:solidFill>
-              </a:rPr>
-              <a:t>gestion de l’annulation de la sortie</a:t>
-            </a:r>
+            <a:endParaRPr lang="en-US" sz="2000" dirty="0">
+              <a:solidFill>
+                <a:srgbClr val="FFFFFF"/>
+              </a:solidFill>
+            </a:endParaRPr>
           </a:p>
           <a:p>
             <a:pPr indent="-228600">
               <a:buFont typeface="Arial" panose="020B0604020202020204" pitchFamily="34" charset="0"/>
               <a:buChar char="•"/>
             </a:pPr>
-            <a:endParaRPr lang="en-US" sz="2000">
-              <a:solidFill>
-                <a:srgbClr val="FFFFFF"/>
-              </a:solidFill>
-            </a:endParaRPr>
-          </a:p>
-          <a:p>
-            <a:pPr indent="-228600">
-              <a:buFont typeface="Arial" panose="020B0604020202020204" pitchFamily="34" charset="0"/>
-              <a:buChar char="•"/>
-            </a:pPr>
-            <a:endParaRPr lang="en-US" sz="2000">
+            <a:endParaRPr lang="en-US" sz="2000" dirty="0">
               <a:solidFill>
                 <a:srgbClr val="FFFFFF"/>
               </a:solidFill>
@@ -7404,24 +7617,50 @@
               <a:buFont typeface="Arial" panose="020B0604020202020204" pitchFamily="34" charset="0"/>
               <a:buChar char="•"/>
             </a:pPr>
-            <a:endParaRPr lang="en-US" sz="2000">
+            <a:endParaRPr lang="en-US" sz="2000" dirty="0">
               <a:solidFill>
                 <a:srgbClr val="FFFFFF"/>
               </a:solidFill>
             </a:endParaRPr>
           </a:p>
           <a:p>
+            <a:r>
+              <a:rPr lang="en-US" sz="2000" dirty="0">
+                <a:solidFill>
+                  <a:srgbClr val="FFFFFF"/>
+                </a:solidFill>
+              </a:rPr>
+              <a:t>TODO:</a:t>
+            </a:r>
+          </a:p>
+          <a:p>
             <a:pPr indent="-228600">
               <a:buFont typeface="Arial" panose="020B0604020202020204" pitchFamily="34" charset="0"/>
               <a:buChar char="•"/>
             </a:pPr>
             <a:r>
-              <a:rPr lang="en-US" sz="2000">
+              <a:rPr lang="en-US" sz="2000" dirty="0">
                 <a:solidFill>
                   <a:srgbClr val="FFFFFF"/>
                 </a:solidFill>
               </a:rPr>
-              <a:t>TODO:</a:t>
+              <a:t>gestion de </a:t>
+            </a:r>
+            <a:r>
+              <a:rPr lang="en-US" sz="2000" dirty="0" err="1">
+                <a:solidFill>
+                  <a:srgbClr val="FFFFFF"/>
+                </a:solidFill>
+              </a:rPr>
+              <a:t>l’annulation</a:t>
+            </a:r>
+            <a:r>
+              <a:rPr lang="en-US" sz="2000" dirty="0">
+                <a:solidFill>
+                  <a:srgbClr val="FFFFFF"/>
+                </a:solidFill>
+              </a:rPr>
+              <a:t> dela sortie</a:t>
             </a:r>
           </a:p>
           <a:p>
@@ -7430,45 +7669,52 @@
               <a:buChar char="•"/>
             </a:pPr>
             <a:r>
-              <a:rPr lang="en-US" sz="2000">
+              <a:rPr lang="en-US" sz="2000" dirty="0" err="1">
                 <a:solidFill>
                   <a:srgbClr val="FFFFFF"/>
                 </a:solidFill>
               </a:rPr>
-              <a:t>gestion de l’annulation dela sortie</a:t>
-            </a:r>
+              <a:t>amélioration</a:t>
+            </a:r>
+            <a:r>
+              <a:rPr lang="en-US" sz="2000" dirty="0">
+                <a:solidFill>
+                  <a:srgbClr val="FFFFFF"/>
+                </a:solidFill>
+              </a:rPr>
+              <a:t> de </a:t>
+            </a:r>
+            <a:r>
+              <a:rPr lang="en-US" sz="2000" dirty="0" err="1">
+                <a:solidFill>
+                  <a:srgbClr val="FFFFFF"/>
+                </a:solidFill>
+              </a:rPr>
+              <a:t>l’affichage</a:t>
+            </a:r>
+            <a:endParaRPr lang="en-US" sz="2000" dirty="0">
+              <a:solidFill>
+                <a:srgbClr val="FFFFFF"/>
+              </a:solidFill>
+            </a:endParaRPr>
           </a:p>
           <a:p>
             <a:pPr indent="-228600">
               <a:buFont typeface="Arial" panose="020B0604020202020204" pitchFamily="34" charset="0"/>
               <a:buChar char="•"/>
             </a:pPr>
-            <a:r>
-              <a:rPr lang="en-US" sz="2000">
-                <a:solidFill>
-                  <a:srgbClr val="FFFFFF"/>
-                </a:solidFill>
-              </a:rPr>
-              <a:t>amélioration de l’affichage</a:t>
-            </a:r>
+            <a:endParaRPr lang="en-US" sz="2000" dirty="0">
+              <a:solidFill>
+                <a:srgbClr val="FFFFFF"/>
+              </a:solidFill>
+            </a:endParaRPr>
           </a:p>
           <a:p>
             <a:pPr indent="-228600">
               <a:buFont typeface="Arial" panose="020B0604020202020204" pitchFamily="34" charset="0"/>
               <a:buChar char="•"/>
             </a:pPr>
-            <a:endParaRPr lang="en-US" sz="2000">
-              <a:solidFill>
-                <a:srgbClr val="FFFFFF"/>
-              </a:solidFill>
-            </a:endParaRPr>
-          </a:p>
-          <a:p>
-            <a:pPr indent="-228600">
-              <a:buFont typeface="Arial" panose="020B0604020202020204" pitchFamily="34" charset="0"/>
-              <a:buChar char="•"/>
-            </a:pPr>
-            <a:endParaRPr lang="en-US" sz="2000">
+            <a:endParaRPr lang="en-US" sz="2000" dirty="0">
               <a:solidFill>
                 <a:srgbClr val="FFFFFF"/>
               </a:solidFill>

</xml_diff>